<commit_message>
Some files are edited
</commit_message>
<xml_diff>
--- a/Diploma/Защита диплома Красницкий.pptx
+++ b/Diploma/Защита диплома Красницкий.pptx
@@ -12825,8 +12825,8 @@
         </p:blipFill>
         <p:spPr>
           <a:xfrm>
-            <a:off x="397431" y="1152513"/>
-            <a:ext cx="5114925" cy="1419225"/>
+            <a:off x="6018731" y="1746013"/>
+            <a:ext cx="1009650" cy="333375"/>
           </a:xfrm>
           <a:prstGeom prst="rect">
             <a:avLst/>
@@ -12853,8 +12853,8 @@
         </p:blipFill>
         <p:spPr>
           <a:xfrm>
-            <a:off x="6018731" y="1746013"/>
-            <a:ext cx="1009650" cy="333375"/>
+            <a:off x="701106" y="2784488"/>
+            <a:ext cx="2352675" cy="942975"/>
           </a:xfrm>
           <a:prstGeom prst="rect">
             <a:avLst/>
@@ -12865,37 +12865,9 @@
           </a:ln>
         </p:spPr>
       </p:pic>
-      <p:pic>
-        <p:nvPicPr>
-          <p:cNvPr id="154" name="Google Shape;154;p20"/>
-          <p:cNvPicPr preferRelativeResize="0"/>
-          <p:nvPr/>
-        </p:nvPicPr>
-        <p:blipFill>
-          <a:blip r:embed="rId5">
-            <a:alphaModFix/>
-          </a:blip>
-          <a:stretch>
-            <a:fillRect/>
-          </a:stretch>
-        </p:blipFill>
-        <p:spPr>
-          <a:xfrm>
-            <a:off x="701106" y="2724138"/>
-            <a:ext cx="2352675" cy="942975"/>
-          </a:xfrm>
-          <a:prstGeom prst="rect">
-            <a:avLst/>
-          </a:prstGeom>
-          <a:noFill/>
-          <a:ln>
-            <a:noFill/>
-          </a:ln>
-        </p:spPr>
-      </p:pic>
       <p:sp>
         <p:nvSpPr>
-          <p:cNvPr id="155" name="Google Shape;155;p20"/>
+          <p:cNvPr id="154" name="Google Shape;154;p20"/>
           <p:cNvSpPr txBox="1"/>
           <p:nvPr/>
         </p:nvSpPr>
@@ -12934,7 +12906,7 @@
                 <a:cs typeface="Roboto"/>
                 <a:sym typeface="Roboto"/>
               </a:rPr>
-              <a:t>аij - спектральний відлік що відповідає i-ої ноти j-ої октави</a:t>
+              <a:t>аij - спектральний відлік що відповідає j-ої ноти i-ої октави</a:t>
             </a:r>
             <a:endParaRPr>
               <a:latin typeface="Roboto"/>
@@ -12947,12 +12919,12 @@
       </p:sp>
       <p:pic>
         <p:nvPicPr>
-          <p:cNvPr id="156" name="Google Shape;156;p20"/>
+          <p:cNvPr id="155" name="Google Shape;155;p20"/>
           <p:cNvPicPr preferRelativeResize="0"/>
           <p:nvPr/>
         </p:nvPicPr>
         <p:blipFill>
-          <a:blip r:embed="rId6">
+          <a:blip r:embed="rId5">
             <a:alphaModFix/>
           </a:blip>
           <a:stretch>
@@ -12975,7 +12947,7 @@
       </p:pic>
       <p:sp>
         <p:nvSpPr>
-          <p:cNvPr id="157" name="Google Shape;157;p20"/>
+          <p:cNvPr id="156" name="Google Shape;156;p20"/>
           <p:cNvSpPr txBox="1"/>
           <p:nvPr/>
         </p:nvSpPr>
@@ -13025,6 +12997,34 @@
           </a:p>
         </p:txBody>
       </p:sp>
+      <p:pic>
+        <p:nvPicPr>
+          <p:cNvPr id="157" name="Google Shape;157;p20"/>
+          <p:cNvPicPr preferRelativeResize="0"/>
+          <p:nvPr/>
+        </p:nvPicPr>
+        <p:blipFill>
+          <a:blip r:embed="rId6">
+            <a:alphaModFix/>
+          </a:blip>
+          <a:stretch>
+            <a:fillRect/>
+          </a:stretch>
+        </p:blipFill>
+        <p:spPr>
+          <a:xfrm>
+            <a:off x="701100" y="994738"/>
+            <a:ext cx="3339675" cy="1835950"/>
+          </a:xfrm>
+          <a:prstGeom prst="rect">
+            <a:avLst/>
+          </a:prstGeom>
+          <a:noFill/>
+          <a:ln>
+            <a:noFill/>
+          </a:ln>
+        </p:spPr>
+      </p:pic>
     </p:spTree>
   </p:cSld>
   <p:clrMapOvr>

</xml_diff>